<commit_message>
permutation SS task only
</commit_message>
<xml_diff>
--- a/analysis/output/FigsFinal/CV.pptx
+++ b/analysis/output/FigsFinal/CV.pptx
@@ -243,7 +243,7 @@
           <a:p>
             <a:fld id="{95656FF8-6698-2D4C-A6FB-723933382C5D}" type="datetimeFigureOut">
               <a:rPr lang="en-US" smtClean="0"/>
-              <a:t>5/3/21</a:t>
+              <a:t>5/5/21</a:t>
             </a:fld>
             <a:endParaRPr lang="en-US"/>
           </a:p>
@@ -413,7 +413,7 @@
           <a:p>
             <a:fld id="{95656FF8-6698-2D4C-A6FB-723933382C5D}" type="datetimeFigureOut">
               <a:rPr lang="en-US" smtClean="0"/>
-              <a:t>5/3/21</a:t>
+              <a:t>5/5/21</a:t>
             </a:fld>
             <a:endParaRPr lang="en-US"/>
           </a:p>
@@ -593,7 +593,7 @@
           <a:p>
             <a:fld id="{95656FF8-6698-2D4C-A6FB-723933382C5D}" type="datetimeFigureOut">
               <a:rPr lang="en-US" smtClean="0"/>
-              <a:t>5/3/21</a:t>
+              <a:t>5/5/21</a:t>
             </a:fld>
             <a:endParaRPr lang="en-US"/>
           </a:p>
@@ -763,7 +763,7 @@
           <a:p>
             <a:fld id="{95656FF8-6698-2D4C-A6FB-723933382C5D}" type="datetimeFigureOut">
               <a:rPr lang="en-US" smtClean="0"/>
-              <a:t>5/3/21</a:t>
+              <a:t>5/5/21</a:t>
             </a:fld>
             <a:endParaRPr lang="en-US"/>
           </a:p>
@@ -1007,7 +1007,7 @@
           <a:p>
             <a:fld id="{95656FF8-6698-2D4C-A6FB-723933382C5D}" type="datetimeFigureOut">
               <a:rPr lang="en-US" smtClean="0"/>
-              <a:t>5/3/21</a:t>
+              <a:t>5/5/21</a:t>
             </a:fld>
             <a:endParaRPr lang="en-US"/>
           </a:p>
@@ -1239,7 +1239,7 @@
           <a:p>
             <a:fld id="{95656FF8-6698-2D4C-A6FB-723933382C5D}" type="datetimeFigureOut">
               <a:rPr lang="en-US" smtClean="0"/>
-              <a:t>5/3/21</a:t>
+              <a:t>5/5/21</a:t>
             </a:fld>
             <a:endParaRPr lang="en-US"/>
           </a:p>
@@ -1606,7 +1606,7 @@
           <a:p>
             <a:fld id="{95656FF8-6698-2D4C-A6FB-723933382C5D}" type="datetimeFigureOut">
               <a:rPr lang="en-US" smtClean="0"/>
-              <a:t>5/3/21</a:t>
+              <a:t>5/5/21</a:t>
             </a:fld>
             <a:endParaRPr lang="en-US"/>
           </a:p>
@@ -1724,7 +1724,7 @@
           <a:p>
             <a:fld id="{95656FF8-6698-2D4C-A6FB-723933382C5D}" type="datetimeFigureOut">
               <a:rPr lang="en-US" smtClean="0"/>
-              <a:t>5/3/21</a:t>
+              <a:t>5/5/21</a:t>
             </a:fld>
             <a:endParaRPr lang="en-US"/>
           </a:p>
@@ -1819,7 +1819,7 @@
           <a:p>
             <a:fld id="{95656FF8-6698-2D4C-A6FB-723933382C5D}" type="datetimeFigureOut">
               <a:rPr lang="en-US" smtClean="0"/>
-              <a:t>5/3/21</a:t>
+              <a:t>5/5/21</a:t>
             </a:fld>
             <a:endParaRPr lang="en-US"/>
           </a:p>
@@ -2096,7 +2096,7 @@
           <a:p>
             <a:fld id="{95656FF8-6698-2D4C-A6FB-723933382C5D}" type="datetimeFigureOut">
               <a:rPr lang="en-US" smtClean="0"/>
-              <a:t>5/3/21</a:t>
+              <a:t>5/5/21</a:t>
             </a:fld>
             <a:endParaRPr lang="en-US"/>
           </a:p>
@@ -2353,7 +2353,7 @@
           <a:p>
             <a:fld id="{95656FF8-6698-2D4C-A6FB-723933382C5D}" type="datetimeFigureOut">
               <a:rPr lang="en-US" smtClean="0"/>
-              <a:t>5/3/21</a:t>
+              <a:t>5/5/21</a:t>
             </a:fld>
             <a:endParaRPr lang="en-US"/>
           </a:p>
@@ -2566,7 +2566,7 @@
           <a:p>
             <a:fld id="{95656FF8-6698-2D4C-A6FB-723933382C5D}" type="datetimeFigureOut">
               <a:rPr lang="en-US" smtClean="0"/>
-              <a:t>5/3/21</a:t>
+              <a:t>5/5/21</a:t>
             </a:fld>
             <a:endParaRPr lang="en-US"/>
           </a:p>
@@ -3812,7 +3812,7 @@
                     <a:srgbClr val="00B050"/>
                   </a:solidFill>
                 </a:rPr>
-                <a:t>Task A</a:t>
+                <a:t>Motor</a:t>
               </a:r>
             </a:p>
           </p:txBody>
@@ -4554,7 +4554,7 @@
                   <a:srgbClr val="00B050"/>
                 </a:solidFill>
               </a:rPr>
-              <a:t>Task A</a:t>
+              <a:t>Motor</a:t>
             </a:r>
           </a:p>
         </p:txBody>
@@ -5108,8 +5108,8 @@
         </p:nvSpPr>
         <p:spPr>
           <a:xfrm>
-            <a:off x="10139045" y="9126293"/>
-            <a:ext cx="775138" cy="338554"/>
+            <a:off x="10079670" y="9126293"/>
+            <a:ext cx="1069723" cy="307777"/>
           </a:xfrm>
           <a:prstGeom prst="rect">
             <a:avLst/>
@@ -5123,12 +5123,12 @@
           <a:lstStyle/>
           <a:p>
             <a:r>
-              <a:rPr lang="en-US" sz="1600" dirty="0">
+              <a:rPr lang="en-US" sz="1400" dirty="0">
                 <a:solidFill>
                   <a:schemeClr val="accent4"/>
                 </a:solidFill>
               </a:rPr>
-              <a:t>Task B</a:t>
+              <a:t>Memory</a:t>
             </a:r>
           </a:p>
         </p:txBody>
@@ -5552,7 +5552,7 @@
                     <a:latin typeface="Arial" panose="020B0604020202020204" pitchFamily="34" charset="0"/>
                     <a:cs typeface="Arial" panose="020B0604020202020204" pitchFamily="34" charset="0"/>
                   </a:rPr>
-                  <a:t>Task A</a:t>
+                  <a:t>Motor</a:t>
                 </a:r>
               </a:p>
             </p:txBody>
@@ -5670,7 +5670,7 @@
                     <a:latin typeface="Arial" panose="020B0604020202020204" pitchFamily="34" charset="0"/>
                     <a:cs typeface="Arial" panose="020B0604020202020204" pitchFamily="34" charset="0"/>
                   </a:rPr>
-                  <a:t>Task B</a:t>
+                  <a:t>Memory</a:t>
                 </a:r>
               </a:p>
             </p:txBody>
@@ -5779,7 +5779,7 @@
             <p:spPr>
               <a:xfrm>
                 <a:off x="1367876" y="2553229"/>
-                <a:ext cx="1797269" cy="767232"/>
+                <a:ext cx="1797269" cy="731851"/>
               </a:xfrm>
               <a:prstGeom prst="rect">
                 <a:avLst/>
@@ -5811,7 +5811,7 @@
                     <a:latin typeface="Arial" panose="020B0604020202020204" pitchFamily="34" charset="0"/>
                     <a:cs typeface="Arial" panose="020B0604020202020204" pitchFamily="34" charset="0"/>
                   </a:rPr>
-                  <a:t>Task A</a:t>
+                  <a:t>Motor</a:t>
                 </a:r>
               </a:p>
             </p:txBody>
@@ -5899,7 +5899,7 @@
             <p:spPr>
               <a:xfrm>
                 <a:off x="6118418" y="2322184"/>
-                <a:ext cx="1797269" cy="781960"/>
+                <a:ext cx="1797269" cy="712378"/>
               </a:xfrm>
               <a:prstGeom prst="rect">
                 <a:avLst/>
@@ -5931,7 +5931,7 @@
                     <a:latin typeface="Arial" panose="020B0604020202020204" pitchFamily="34" charset="0"/>
                     <a:cs typeface="Arial" panose="020B0604020202020204" pitchFamily="34" charset="0"/>
                   </a:rPr>
-                  <a:t>Task A</a:t>
+                  <a:t>Motor</a:t>
                 </a:r>
               </a:p>
             </p:txBody>
@@ -6092,7 +6092,7 @@
         <p:spPr>
           <a:xfrm>
             <a:off x="1596667" y="5192635"/>
-            <a:ext cx="1334020" cy="461665"/>
+            <a:ext cx="1529586" cy="461665"/>
           </a:xfrm>
           <a:prstGeom prst="rect">
             <a:avLst/>
@@ -6107,7 +6107,7 @@
           <a:p>
             <a:r>
               <a:rPr lang="en-US" sz="2400" u="sng" dirty="0"/>
-              <a:t>Split Task</a:t>
+              <a:t>Single Task</a:t>
             </a:r>
           </a:p>
         </p:txBody>
@@ -6220,7 +6220,7 @@
                   <a:srgbClr val="00B050"/>
                 </a:solidFill>
               </a:rPr>
-              <a:t>Task A</a:t>
+              <a:t>Motor</a:t>
             </a:r>
           </a:p>
         </p:txBody>

</xml_diff>